<commit_message>
Structureal changes and architecture ppt
</commit_message>
<xml_diff>
--- a/Architecture.pptx
+++ b/Architecture.pptx
@@ -104,6 +104,11 @@
       </a:defRPr>
     </a:lvl9pPr>
   </p:defaultTextStyle>
+  <p:extLst>
+    <p:ext uri="{EFAFB233-063F-42B5-8137-9DF3F51BA10A}">
+      <p15:sldGuideLst xmlns:p15="http://schemas.microsoft.com/office/powerpoint/2012/main"/>
+    </p:ext>
+  </p:extLst>
 </p:presentation>
 </file>
 
@@ -2966,6 +2971,63 @@
       </p:grpSpPr>
       <p:sp>
         <p:nvSpPr>
+          <p:cNvPr id="2" name="Rectangle 1"/>
+          <p:cNvSpPr/>
+          <p:nvPr/>
+        </p:nvSpPr>
+        <p:spPr>
+          <a:xfrm>
+            <a:off x="538619" y="388307"/>
+            <a:ext cx="10484285" cy="5937337"/>
+          </a:xfrm>
+          <a:prstGeom prst="rect">
+            <a:avLst/>
+          </a:prstGeom>
+          <a:solidFill>
+            <a:schemeClr val="accent6">
+              <a:lumMod val="20000"/>
+              <a:lumOff val="80000"/>
+            </a:schemeClr>
+          </a:solidFill>
+        </p:spPr>
+        <p:style>
+          <a:lnRef idx="2">
+            <a:schemeClr val="accent1">
+              <a:shade val="50000"/>
+            </a:schemeClr>
+          </a:lnRef>
+          <a:fillRef idx="1">
+            <a:schemeClr val="accent1"/>
+          </a:fillRef>
+          <a:effectRef idx="0">
+            <a:schemeClr val="accent1"/>
+          </a:effectRef>
+          <a:fontRef idx="minor">
+            <a:schemeClr val="lt1"/>
+          </a:fontRef>
+        </p:style>
+        <p:txBody>
+          <a:bodyPr rtlCol="0" anchor="b"/>
+          <a:lstStyle/>
+          <a:p>
+            <a:r>
+              <a:rPr lang="en-US" sz="2800" b="1" dirty="0" smtClean="0">
+                <a:solidFill>
+                  <a:schemeClr val="accent6"/>
+                </a:solidFill>
+              </a:rPr>
+              <a:t>DOCKER</a:t>
+            </a:r>
+            <a:endParaRPr lang="en-US" sz="2800" b="1" dirty="0">
+              <a:solidFill>
+                <a:schemeClr val="accent6"/>
+              </a:solidFill>
+            </a:endParaRPr>
+          </a:p>
+        </p:txBody>
+      </p:sp>
+      <p:sp>
+        <p:nvSpPr>
           <p:cNvPr id="20" name="Rectangle 19"/>
           <p:cNvSpPr/>
           <p:nvPr/>

</xml_diff>